<commit_message>
bugtesting for downsampling script.
</commit_message>
<xml_diff>
--- a/Summary/20220624_microbiome_demographic_slides.pptx
+++ b/Summary/20220624_microbiome_demographic_slides.pptx
@@ -5,13 +5,16 @@
     <p:sldMasterId id="2147483648" r:id="rId1"/>
   </p:sldMasterIdLst>
   <p:notesMasterIdLst>
-    <p:notesMasterId r:id="rId6"/>
+    <p:notesMasterId r:id="rId9"/>
   </p:notesMasterIdLst>
   <p:sldIdLst>
     <p:sldId id="256" r:id="rId2"/>
     <p:sldId id="366" r:id="rId3"/>
     <p:sldId id="401" r:id="rId4"/>
-    <p:sldId id="400" r:id="rId5"/>
+    <p:sldId id="402" r:id="rId5"/>
+    <p:sldId id="403" r:id="rId6"/>
+    <p:sldId id="404" r:id="rId7"/>
+    <p:sldId id="400" r:id="rId8"/>
   </p:sldIdLst>
   <p:sldSz cx="12192000" cy="6858000"/>
   <p:notesSz cx="6858000" cy="9144000"/>
@@ -118,6 +121,9 @@
             <p14:sldId id="256"/>
             <p14:sldId id="366"/>
             <p14:sldId id="401"/>
+            <p14:sldId id="402"/>
+            <p14:sldId id="403"/>
+            <p14:sldId id="404"/>
             <p14:sldId id="400"/>
           </p14:sldIdLst>
         </p14:section>
@@ -133,7 +139,8 @@
 <file path=ppt/revisionInfo.xml><?xml version="1.0" encoding="utf-8"?>
 <p1510:revInfo xmlns:a="http://schemas.openxmlformats.org/drawingml/2006/main" xmlns:r="http://schemas.openxmlformats.org/officeDocument/2006/relationships" xmlns:p1510="http://schemas.microsoft.com/office/powerpoint/2015/10/main">
   <p1510:revLst>
-    <p1510:client id="{B2743461-8AA5-4D76-92E2-E503ABDB407D}" v="1" dt="2022-06-24T16:18:20.059"/>
+    <p1510:client id="{B2743461-8AA5-4D76-92E2-E503ABDB407D}" v="352" dt="2022-06-24T18:34:05.457"/>
+    <p1510:client id="{FB83F72D-C3DC-459E-A04A-1098E5266807}" v="434" dt="2022-06-24T18:45:56.259"/>
   </p1510:revLst>
 </p1510:revInfo>
 </file>
@@ -141,9 +148,78 @@
 <file path=ppt/changesInfos/changesInfo1.xml><?xml version="1.0" encoding="utf-8"?>
 <pc:chgInfo xmlns:a="http://schemas.openxmlformats.org/drawingml/2006/main" xmlns:r="http://schemas.openxmlformats.org/officeDocument/2006/relationships" xmlns:ac="http://schemas.microsoft.com/office/drawing/2013/main/command" xmlns:pc="http://schemas.microsoft.com/office/powerpoint/2013/main/command">
   <pc:docChgLst>
+    <pc:chgData name="Jonathan Mah" userId="5261b2f2f3e51194" providerId="LiveId" clId="{FB83F72D-C3DC-459E-A04A-1098E5266807}"/>
+    <pc:docChg chg="custSel modSld">
+      <pc:chgData name="Jonathan Mah" userId="5261b2f2f3e51194" providerId="LiveId" clId="{FB83F72D-C3DC-459E-A04A-1098E5266807}" dt="2022-06-24T18:45:56.259" v="433" actId="20577"/>
+      <pc:docMkLst>
+        <pc:docMk/>
+      </pc:docMkLst>
+      <pc:sldChg chg="modSp mod">
+        <pc:chgData name="Jonathan Mah" userId="5261b2f2f3e51194" providerId="LiveId" clId="{FB83F72D-C3DC-459E-A04A-1098E5266807}" dt="2022-06-24T18:45:56.259" v="433" actId="20577"/>
+        <pc:sldMkLst>
+          <pc:docMk/>
+          <pc:sldMk cId="107190669" sldId="400"/>
+        </pc:sldMkLst>
+        <pc:spChg chg="mod">
+          <ac:chgData name="Jonathan Mah" userId="5261b2f2f3e51194" providerId="LiveId" clId="{FB83F72D-C3DC-459E-A04A-1098E5266807}" dt="2022-06-24T18:45:56.259" v="433" actId="20577"/>
+          <ac:spMkLst>
+            <pc:docMk/>
+            <pc:sldMk cId="107190669" sldId="400"/>
+            <ac:spMk id="3" creationId="{AADD84A0-4056-4C50-9D26-2BA6AE9D454C}"/>
+          </ac:spMkLst>
+        </pc:spChg>
+      </pc:sldChg>
+      <pc:sldChg chg="modSp mod">
+        <pc:chgData name="Jonathan Mah" userId="5261b2f2f3e51194" providerId="LiveId" clId="{FB83F72D-C3DC-459E-A04A-1098E5266807}" dt="2022-06-24T18:44:04.204" v="314" actId="20577"/>
+        <pc:sldMkLst>
+          <pc:docMk/>
+          <pc:sldMk cId="2010993810" sldId="401"/>
+        </pc:sldMkLst>
+        <pc:spChg chg="mod">
+          <ac:chgData name="Jonathan Mah" userId="5261b2f2f3e51194" providerId="LiveId" clId="{FB83F72D-C3DC-459E-A04A-1098E5266807}" dt="2022-06-24T18:44:04.204" v="314" actId="20577"/>
+          <ac:spMkLst>
+            <pc:docMk/>
+            <pc:sldMk cId="2010993810" sldId="401"/>
+            <ac:spMk id="3" creationId="{0185D601-86C1-40AA-B68A-90906EDD42C9}"/>
+          </ac:spMkLst>
+        </pc:spChg>
+      </pc:sldChg>
+      <pc:sldChg chg="modSp mod">
+        <pc:chgData name="Jonathan Mah" userId="5261b2f2f3e51194" providerId="LiveId" clId="{FB83F72D-C3DC-459E-A04A-1098E5266807}" dt="2022-06-24T18:18:30.828" v="246" actId="20577"/>
+        <pc:sldMkLst>
+          <pc:docMk/>
+          <pc:sldMk cId="3721153668" sldId="402"/>
+        </pc:sldMkLst>
+        <pc:spChg chg="mod">
+          <ac:chgData name="Jonathan Mah" userId="5261b2f2f3e51194" providerId="LiveId" clId="{FB83F72D-C3DC-459E-A04A-1098E5266807}" dt="2022-06-24T18:18:30.828" v="246" actId="20577"/>
+          <ac:spMkLst>
+            <pc:docMk/>
+            <pc:sldMk cId="3721153668" sldId="402"/>
+            <ac:spMk id="3" creationId="{CF063477-FE77-35A8-85AB-DA766C6E6801}"/>
+          </ac:spMkLst>
+        </pc:spChg>
+      </pc:sldChg>
+      <pc:sldChg chg="addSp modSp mod">
+        <pc:chgData name="Jonathan Mah" userId="5261b2f2f3e51194" providerId="LiveId" clId="{FB83F72D-C3DC-459E-A04A-1098E5266807}" dt="2022-06-24T18:16:05.410" v="207" actId="1076"/>
+        <pc:sldMkLst>
+          <pc:docMk/>
+          <pc:sldMk cId="3895373339" sldId="403"/>
+        </pc:sldMkLst>
+        <pc:spChg chg="add mod">
+          <ac:chgData name="Jonathan Mah" userId="5261b2f2f3e51194" providerId="LiveId" clId="{FB83F72D-C3DC-459E-A04A-1098E5266807}" dt="2022-06-24T18:16:05.410" v="207" actId="1076"/>
+          <ac:spMkLst>
+            <pc:docMk/>
+            <pc:sldMk cId="3895373339" sldId="403"/>
+            <ac:spMk id="3" creationId="{8C9F757C-AB19-0D9E-C6B9-29912913BE04}"/>
+          </ac:spMkLst>
+        </pc:spChg>
+      </pc:sldChg>
+    </pc:docChg>
+  </pc:docChgLst>
+  <pc:docChgLst>
     <pc:chgData name="Jonathan Mah" userId="5261b2f2f3e51194" providerId="LiveId" clId="{B2743461-8AA5-4D76-92E2-E503ABDB407D}"/>
     <pc:docChg chg="undo custSel addSld delSld modSld modSection">
-      <pc:chgData name="Jonathan Mah" userId="5261b2f2f3e51194" providerId="LiveId" clId="{B2743461-8AA5-4D76-92E2-E503ABDB407D}" dt="2022-06-24T16:21:59.222" v="735" actId="20577"/>
+      <pc:chgData name="Jonathan Mah" userId="5261b2f2f3e51194" providerId="LiveId" clId="{B2743461-8AA5-4D76-92E2-E503ABDB407D}" dt="2022-06-24T18:34:05.457" v="1723" actId="20577"/>
       <pc:docMkLst>
         <pc:docMk/>
       </pc:docMkLst>
@@ -163,13 +239,13 @@
         </pc:spChg>
       </pc:sldChg>
       <pc:sldChg chg="modSp mod">
-        <pc:chgData name="Jonathan Mah" userId="5261b2f2f3e51194" providerId="LiveId" clId="{B2743461-8AA5-4D76-92E2-E503ABDB407D}" dt="2022-06-24T16:18:10.841" v="149" actId="20577"/>
+        <pc:chgData name="Jonathan Mah" userId="5261b2f2f3e51194" providerId="LiveId" clId="{B2743461-8AA5-4D76-92E2-E503ABDB407D}" dt="2022-06-24T18:01:00.251" v="1391" actId="20577"/>
         <pc:sldMkLst>
           <pc:docMk/>
           <pc:sldMk cId="2977728054" sldId="366"/>
         </pc:sldMkLst>
         <pc:spChg chg="mod">
-          <ac:chgData name="Jonathan Mah" userId="5261b2f2f3e51194" providerId="LiveId" clId="{B2743461-8AA5-4D76-92E2-E503ABDB407D}" dt="2022-06-24T16:18:10.841" v="149" actId="20577"/>
+          <ac:chgData name="Jonathan Mah" userId="5261b2f2f3e51194" providerId="LiveId" clId="{B2743461-8AA5-4D76-92E2-E503ABDB407D}" dt="2022-06-24T18:01:00.251" v="1391" actId="20577"/>
           <ac:spMkLst>
             <pc:docMk/>
             <pc:sldMk cId="2977728054" sldId="366"/>
@@ -183,6 +259,21 @@
           <pc:docMk/>
           <pc:sldMk cId="2533509981" sldId="399"/>
         </pc:sldMkLst>
+      </pc:sldChg>
+      <pc:sldChg chg="modSp mod">
+        <pc:chgData name="Jonathan Mah" userId="5261b2f2f3e51194" providerId="LiveId" clId="{B2743461-8AA5-4D76-92E2-E503ABDB407D}" dt="2022-06-24T18:34:05.457" v="1723" actId="20577"/>
+        <pc:sldMkLst>
+          <pc:docMk/>
+          <pc:sldMk cId="107190669" sldId="400"/>
+        </pc:sldMkLst>
+        <pc:spChg chg="mod">
+          <ac:chgData name="Jonathan Mah" userId="5261b2f2f3e51194" providerId="LiveId" clId="{B2743461-8AA5-4D76-92E2-E503ABDB407D}" dt="2022-06-24T18:34:05.457" v="1723" actId="20577"/>
+          <ac:spMkLst>
+            <pc:docMk/>
+            <pc:sldMk cId="107190669" sldId="400"/>
+            <ac:spMk id="3" creationId="{AADD84A0-4056-4C50-9D26-2BA6AE9D454C}"/>
+          </ac:spMkLst>
+        </pc:spChg>
       </pc:sldChg>
       <pc:sldChg chg="modSp add mod">
         <pc:chgData name="Jonathan Mah" userId="5261b2f2f3e51194" providerId="LiveId" clId="{B2743461-8AA5-4D76-92E2-E503ABDB407D}" dt="2022-06-24T16:21:59.222" v="735" actId="20577"/>
@@ -213,6 +304,147 @@
           <pc:docMk/>
           <pc:sldMk cId="2124606747" sldId="401"/>
         </pc:sldMkLst>
+      </pc:sldChg>
+      <pc:sldChg chg="modSp new mod">
+        <pc:chgData name="Jonathan Mah" userId="5261b2f2f3e51194" providerId="LiveId" clId="{B2743461-8AA5-4D76-92E2-E503ABDB407D}" dt="2022-06-24T17:26:44.905" v="1099" actId="20577"/>
+        <pc:sldMkLst>
+          <pc:docMk/>
+          <pc:sldMk cId="3721153668" sldId="402"/>
+        </pc:sldMkLst>
+        <pc:spChg chg="mod">
+          <ac:chgData name="Jonathan Mah" userId="5261b2f2f3e51194" providerId="LiveId" clId="{B2743461-8AA5-4D76-92E2-E503ABDB407D}" dt="2022-06-24T17:24:10.047" v="769" actId="20577"/>
+          <ac:spMkLst>
+            <pc:docMk/>
+            <pc:sldMk cId="3721153668" sldId="402"/>
+            <ac:spMk id="2" creationId="{CE2DDACF-297A-31E1-413C-2D7FE1742111}"/>
+          </ac:spMkLst>
+        </pc:spChg>
+        <pc:spChg chg="mod">
+          <ac:chgData name="Jonathan Mah" userId="5261b2f2f3e51194" providerId="LiveId" clId="{B2743461-8AA5-4D76-92E2-E503ABDB407D}" dt="2022-06-24T17:26:44.905" v="1099" actId="20577"/>
+          <ac:spMkLst>
+            <pc:docMk/>
+            <pc:sldMk cId="3721153668" sldId="402"/>
+            <ac:spMk id="3" creationId="{CF063477-FE77-35A8-85AB-DA766C6E6801}"/>
+          </ac:spMkLst>
+        </pc:spChg>
+      </pc:sldChg>
+      <pc:sldChg chg="addSp delSp modSp new mod">
+        <pc:chgData name="Jonathan Mah" userId="5261b2f2f3e51194" providerId="LiveId" clId="{B2743461-8AA5-4D76-92E2-E503ABDB407D}" dt="2022-06-24T18:16:52.688" v="1641" actId="1076"/>
+        <pc:sldMkLst>
+          <pc:docMk/>
+          <pc:sldMk cId="3895373339" sldId="403"/>
+        </pc:sldMkLst>
+        <pc:spChg chg="mod">
+          <ac:chgData name="Jonathan Mah" userId="5261b2f2f3e51194" providerId="LiveId" clId="{B2743461-8AA5-4D76-92E2-E503ABDB407D}" dt="2022-06-24T17:50:21.247" v="1156" actId="20577"/>
+          <ac:spMkLst>
+            <pc:docMk/>
+            <pc:sldMk cId="3895373339" sldId="403"/>
+            <ac:spMk id="2" creationId="{C819B54B-2127-BF9E-C506-AFCFAA6D79E3}"/>
+          </ac:spMkLst>
+        </pc:spChg>
+        <pc:spChg chg="del">
+          <ac:chgData name="Jonathan Mah" userId="5261b2f2f3e51194" providerId="LiveId" clId="{B2743461-8AA5-4D76-92E2-E503ABDB407D}" dt="2022-06-24T17:50:11.623" v="1134"/>
+          <ac:spMkLst>
+            <pc:docMk/>
+            <pc:sldMk cId="3895373339" sldId="403"/>
+            <ac:spMk id="3" creationId="{DE32EA4D-3286-5C61-E3E1-72CF10C674C6}"/>
+          </ac:spMkLst>
+        </pc:spChg>
+        <pc:spChg chg="add del mod">
+          <ac:chgData name="Jonathan Mah" userId="5261b2f2f3e51194" providerId="LiveId" clId="{B2743461-8AA5-4D76-92E2-E503ABDB407D}" dt="2022-06-24T17:50:15.832" v="1137"/>
+          <ac:spMkLst>
+            <pc:docMk/>
+            <pc:sldMk cId="3895373339" sldId="403"/>
+            <ac:spMk id="4" creationId="{050441F5-05D3-6840-0628-0F4A03AE3766}"/>
+          </ac:spMkLst>
+        </pc:spChg>
+        <pc:spChg chg="add del mod">
+          <ac:chgData name="Jonathan Mah" userId="5261b2f2f3e51194" providerId="LiveId" clId="{B2743461-8AA5-4D76-92E2-E503ABDB407D}" dt="2022-06-24T17:50:15.812" v="1136"/>
+          <ac:spMkLst>
+            <pc:docMk/>
+            <pc:sldMk cId="3895373339" sldId="403"/>
+            <ac:spMk id="5" creationId="{9A32E1BE-FDE0-A13B-F223-4259B26A66EC}"/>
+          </ac:spMkLst>
+        </pc:spChg>
+        <pc:spChg chg="add del mod">
+          <ac:chgData name="Jonathan Mah" userId="5261b2f2f3e51194" providerId="LiveId" clId="{B2743461-8AA5-4D76-92E2-E503ABDB407D}" dt="2022-06-24T18:16:47.473" v="1640" actId="478"/>
+          <ac:spMkLst>
+            <pc:docMk/>
+            <pc:sldMk cId="3895373339" sldId="403"/>
+            <ac:spMk id="9" creationId="{8A85D8CA-8E0F-DC7D-7A61-B33972DECEE7}"/>
+          </ac:spMkLst>
+        </pc:spChg>
+        <pc:spChg chg="add del">
+          <ac:chgData name="Jonathan Mah" userId="5261b2f2f3e51194" providerId="LiveId" clId="{B2743461-8AA5-4D76-92E2-E503ABDB407D}" dt="2022-06-24T18:16:36.283" v="1635"/>
+          <ac:spMkLst>
+            <pc:docMk/>
+            <pc:sldMk cId="3895373339" sldId="403"/>
+            <ac:spMk id="10" creationId="{EE2C3069-9974-B4FC-B47B-9D8A594CDD91}"/>
+          </ac:spMkLst>
+        </pc:spChg>
+        <pc:graphicFrameChg chg="add mod modGraphic">
+          <ac:chgData name="Jonathan Mah" userId="5261b2f2f3e51194" providerId="LiveId" clId="{B2743461-8AA5-4D76-92E2-E503ABDB407D}" dt="2022-06-24T17:58:17.927" v="1345" actId="20577"/>
+          <ac:graphicFrameMkLst>
+            <pc:docMk/>
+            <pc:sldMk cId="3895373339" sldId="403"/>
+            <ac:graphicFrameMk id="7" creationId="{130249C3-728E-D98F-C94F-EB7F250C92FE}"/>
+          </ac:graphicFrameMkLst>
+        </pc:graphicFrameChg>
+        <pc:picChg chg="add del mod">
+          <ac:chgData name="Jonathan Mah" userId="5261b2f2f3e51194" providerId="LiveId" clId="{B2743461-8AA5-4D76-92E2-E503ABDB407D}" dt="2022-06-24T18:16:34.026" v="1633" actId="478"/>
+          <ac:picMkLst>
+            <pc:docMk/>
+            <pc:sldMk cId="3895373339" sldId="403"/>
+            <ac:picMk id="6" creationId="{6BAA32E4-C1F9-174C-3408-9E560D7FC2F7}"/>
+          </ac:picMkLst>
+        </pc:picChg>
+        <pc:picChg chg="add mod ord">
+          <ac:chgData name="Jonathan Mah" userId="5261b2f2f3e51194" providerId="LiveId" clId="{B2743461-8AA5-4D76-92E2-E503ABDB407D}" dt="2022-06-24T18:16:52.688" v="1641" actId="1076"/>
+          <ac:picMkLst>
+            <pc:docMk/>
+            <pc:sldMk cId="3895373339" sldId="403"/>
+            <ac:picMk id="11" creationId="{B5839E71-1AA0-1CAB-1C77-A648BAEB41D1}"/>
+          </ac:picMkLst>
+        </pc:picChg>
+      </pc:sldChg>
+      <pc:sldChg chg="addSp delSp modSp new mod">
+        <pc:chgData name="Jonathan Mah" userId="5261b2f2f3e51194" providerId="LiveId" clId="{B2743461-8AA5-4D76-92E2-E503ABDB407D}" dt="2022-06-24T18:04:20.141" v="1521" actId="20577"/>
+        <pc:sldMkLst>
+          <pc:docMk/>
+          <pc:sldMk cId="3780593580" sldId="404"/>
+        </pc:sldMkLst>
+        <pc:spChg chg="mod">
+          <ac:chgData name="Jonathan Mah" userId="5261b2f2f3e51194" providerId="LiveId" clId="{B2743461-8AA5-4D76-92E2-E503ABDB407D}" dt="2022-06-24T17:56:48.310" v="1260" actId="2711"/>
+          <ac:spMkLst>
+            <pc:docMk/>
+            <pc:sldMk cId="3780593580" sldId="404"/>
+            <ac:spMk id="2" creationId="{6DE57635-0150-BECC-C889-D52CC577CB25}"/>
+          </ac:spMkLst>
+        </pc:spChg>
+        <pc:spChg chg="del">
+          <ac:chgData name="Jonathan Mah" userId="5261b2f2f3e51194" providerId="LiveId" clId="{B2743461-8AA5-4D76-92E2-E503ABDB407D}" dt="2022-06-24T17:50:43.911" v="1159" actId="3680"/>
+          <ac:spMkLst>
+            <pc:docMk/>
+            <pc:sldMk cId="3780593580" sldId="404"/>
+            <ac:spMk id="3" creationId="{CDB578EF-B112-3214-83F1-C6A1C7DD11EA}"/>
+          </ac:spMkLst>
+        </pc:spChg>
+        <pc:spChg chg="add mod">
+          <ac:chgData name="Jonathan Mah" userId="5261b2f2f3e51194" providerId="LiveId" clId="{B2743461-8AA5-4D76-92E2-E503ABDB407D}" dt="2022-06-24T18:04:20.141" v="1521" actId="20577"/>
+          <ac:spMkLst>
+            <pc:docMk/>
+            <pc:sldMk cId="3780593580" sldId="404"/>
+            <ac:spMk id="6" creationId="{E9FAF2D6-9667-5925-A68F-F749AA360964}"/>
+          </ac:spMkLst>
+        </pc:spChg>
+        <pc:graphicFrameChg chg="add del mod ord modGraphic">
+          <ac:chgData name="Jonathan Mah" userId="5261b2f2f3e51194" providerId="LiveId" clId="{B2743461-8AA5-4D76-92E2-E503ABDB407D}" dt="2022-06-24T17:57:15.211" v="1262" actId="21"/>
+          <ac:graphicFrameMkLst>
+            <pc:docMk/>
+            <pc:sldMk cId="3780593580" sldId="404"/>
+            <ac:graphicFrameMk id="4" creationId="{F572BC20-5759-15E0-A4C4-B3757892C7E3}"/>
+          </ac:graphicFrameMkLst>
+        </pc:graphicFrameChg>
       </pc:sldChg>
     </pc:docChg>
   </pc:docChgLst>
@@ -4120,7 +4352,7 @@
           <a:lstStyle/>
           <a:p>
             <a:r>
-              <a:rPr lang="en-US" dirty="0">
+              <a:rPr lang="en-US">
                 <a:solidFill>
                   <a:schemeClr val="tx1">
                     <a:lumMod val="50000"/>
@@ -4135,7 +4367,7 @@
           </a:p>
           <a:p>
             <a:r>
-              <a:rPr lang="en-US" dirty="0">
+              <a:rPr lang="en-US">
                 <a:solidFill>
                   <a:schemeClr val="tx1">
                     <a:lumMod val="50000"/>
@@ -4150,7 +4382,7 @@
           </a:p>
           <a:p>
             <a:r>
-              <a:rPr lang="en-US" dirty="0">
+              <a:rPr lang="en-US">
                 <a:solidFill>
                   <a:schemeClr val="tx1">
                     <a:lumMod val="50000"/>
@@ -4217,7 +4449,7 @@
           <a:lstStyle/>
           <a:p>
             <a:r>
-              <a:rPr lang="en-US" dirty="0">
+              <a:rPr lang="en-US">
                 <a:latin typeface="Yu Gothic" panose="020B0400000000000000" pitchFamily="34" charset="-128"/>
                 <a:ea typeface="Yu Gothic" panose="020B0400000000000000" pitchFamily="34" charset="-128"/>
               </a:rPr>
@@ -4250,14 +4482,14 @@
           <a:lstStyle/>
           <a:p>
             <a:r>
-              <a:rPr lang="en-US" dirty="0" err="1">
+              <a:rPr lang="en-US" err="1">
                 <a:latin typeface="Yu Gothic" panose="020B0400000000000000" pitchFamily="34" charset="-128"/>
                 <a:ea typeface="Yu Gothic" panose="020B0400000000000000" pitchFamily="34" charset="-128"/>
               </a:rPr>
               <a:t>Downsampling</a:t>
             </a:r>
             <a:r>
-              <a:rPr lang="en-US" dirty="0">
+              <a:rPr lang="en-US">
                 <a:latin typeface="Yu Gothic" panose="020B0400000000000000" pitchFamily="34" charset="-128"/>
                 <a:ea typeface="Yu Gothic" panose="020B0400000000000000" pitchFamily="34" charset="-128"/>
               </a:rPr>
@@ -4266,14 +4498,14 @@
           </a:p>
           <a:p>
             <a:r>
-              <a:rPr lang="en-US" dirty="0" err="1">
+              <a:rPr lang="en-US" err="1">
                 <a:latin typeface="Yu Gothic" panose="020B0400000000000000" pitchFamily="34" charset="-128"/>
                 <a:ea typeface="Yu Gothic" panose="020B0400000000000000" pitchFamily="34" charset="-128"/>
               </a:rPr>
               <a:t>Patric</a:t>
             </a:r>
             <a:r>
-              <a:rPr lang="en-US" dirty="0">
+              <a:rPr lang="en-US">
                 <a:latin typeface="Yu Gothic" panose="020B0400000000000000" pitchFamily="34" charset="-128"/>
                 <a:ea typeface="Yu Gothic" panose="020B0400000000000000" pitchFamily="34" charset="-128"/>
               </a:rPr>
@@ -4282,21 +4514,39 @@
           </a:p>
           <a:p>
             <a:r>
-              <a:rPr lang="en-US" dirty="0">
+              <a:rPr lang="en-US">
                 <a:latin typeface="Yu Gothic" panose="020B0400000000000000" pitchFamily="34" charset="-128"/>
                 <a:ea typeface="Yu Gothic" panose="020B0400000000000000" pitchFamily="34" charset="-128"/>
               </a:rPr>
-              <a:t>Overleaf WIP</a:t>
-            </a:r>
-          </a:p>
-          <a:p>
-            <a:endParaRPr lang="en-US" dirty="0">
+              <a:t>Overleaf WIP: </a:t>
+            </a:r>
+            <a:r>
+              <a:rPr lang="en-US">
+                <a:latin typeface="Yu Gothic" panose="020B0400000000000000" pitchFamily="34" charset="-128"/>
+                <a:ea typeface="Yu Gothic" panose="020B0400000000000000" pitchFamily="34" charset="-128"/>
+                <a:hlinkClick r:id="rId2"/>
+              </a:rPr>
+              <a:t>https://www.overleaf.com/project/618d1cb43026d96396b379ca</a:t>
+            </a:r>
+            <a:endParaRPr lang="en-US">
               <a:latin typeface="Yu Gothic" panose="020B0400000000000000" pitchFamily="34" charset="-128"/>
               <a:ea typeface="Yu Gothic" panose="020B0400000000000000" pitchFamily="34" charset="-128"/>
             </a:endParaRPr>
           </a:p>
           <a:p>
-            <a:endParaRPr lang="en-US" dirty="0">
+            <a:endParaRPr lang="en-US">
+              <a:latin typeface="Yu Gothic" panose="020B0400000000000000" pitchFamily="34" charset="-128"/>
+              <a:ea typeface="Yu Gothic" panose="020B0400000000000000" pitchFamily="34" charset="-128"/>
+            </a:endParaRPr>
+          </a:p>
+          <a:p>
+            <a:endParaRPr lang="en-US">
+              <a:latin typeface="Yu Gothic" panose="020B0400000000000000" pitchFamily="34" charset="-128"/>
+              <a:ea typeface="Yu Gothic" panose="020B0400000000000000" pitchFamily="34" charset="-128"/>
+            </a:endParaRPr>
+          </a:p>
+          <a:p>
+            <a:endParaRPr lang="en-US">
               <a:latin typeface="Yu Gothic" panose="020B0400000000000000" pitchFamily="34" charset="-128"/>
               <a:ea typeface="Yu Gothic" panose="020B0400000000000000" pitchFamily="34" charset="-128"/>
             </a:endParaRPr>
@@ -4355,7 +4605,7 @@
           <a:lstStyle/>
           <a:p>
             <a:r>
-              <a:rPr lang="en-US" dirty="0">
+              <a:rPr lang="en-US">
                 <a:latin typeface="Yu Gothic" panose="020B0400000000000000" pitchFamily="34" charset="-128"/>
                 <a:ea typeface="Yu Gothic" panose="020B0400000000000000" pitchFamily="34" charset="-128"/>
               </a:rPr>
@@ -4388,21 +4638,21 @@
           <a:lstStyle/>
           <a:p>
             <a:r>
-              <a:rPr lang="en-US" dirty="0">
+              <a:rPr lang="en-US">
                 <a:latin typeface="Yu Gothic" panose="020B0400000000000000" pitchFamily="34" charset="-128"/>
                 <a:ea typeface="Yu Gothic" panose="020B0400000000000000" pitchFamily="34" charset="-128"/>
               </a:rPr>
               <a:t>Investigate models of selection that results in SFS that suggests a “false” contraction of </a:t>
             </a:r>
             <a:r>
-              <a:rPr lang="en-US" dirty="0" err="1">
+              <a:rPr lang="en-US" err="1">
                 <a:latin typeface="Yu Gothic" panose="020B0400000000000000" pitchFamily="34" charset="-128"/>
                 <a:ea typeface="Yu Gothic" panose="020B0400000000000000" pitchFamily="34" charset="-128"/>
               </a:rPr>
               <a:t>N_e</a:t>
             </a:r>
             <a:r>
-              <a:rPr lang="en-US" dirty="0">
+              <a:rPr lang="en-US">
                 <a:latin typeface="Yu Gothic" panose="020B0400000000000000" pitchFamily="34" charset="-128"/>
                 <a:ea typeface="Yu Gothic" panose="020B0400000000000000" pitchFamily="34" charset="-128"/>
               </a:rPr>
@@ -4412,14 +4662,14 @@
           <a:p>
             <a:pPr lvl="1"/>
             <a:r>
-              <a:rPr lang="en-US" dirty="0">
+              <a:rPr lang="en-US">
                 <a:latin typeface="Yu Gothic" panose="020B0400000000000000" pitchFamily="34" charset="-128"/>
                 <a:ea typeface="Yu Gothic" panose="020B0400000000000000" pitchFamily="34" charset="-128"/>
               </a:rPr>
               <a:t>Balancing selection </a:t>
             </a:r>
             <a:r>
-              <a:rPr lang="en-US" dirty="0">
+              <a:rPr lang="en-US">
                 <a:latin typeface="Yu Gothic" panose="020B0400000000000000" pitchFamily="34" charset="-128"/>
                 <a:ea typeface="Yu Gothic" panose="020B0400000000000000" pitchFamily="34" charset="-128"/>
                 <a:sym typeface="Wingdings" panose="05000000000000000000" pitchFamily="2" charset="2"/>
@@ -4427,14 +4677,14 @@
               <a:t> excess of rare and intermediate </a:t>
             </a:r>
             <a:r>
-              <a:rPr lang="en-US" dirty="0" err="1">
+              <a:rPr lang="en-US" err="1">
                 <a:latin typeface="Yu Gothic" panose="020B0400000000000000" pitchFamily="34" charset="-128"/>
                 <a:ea typeface="Yu Gothic" panose="020B0400000000000000" pitchFamily="34" charset="-128"/>
                 <a:sym typeface="Wingdings" panose="05000000000000000000" pitchFamily="2" charset="2"/>
               </a:rPr>
               <a:t>freq</a:t>
             </a:r>
-            <a:endParaRPr lang="en-US" dirty="0">
+            <a:endParaRPr lang="en-US">
               <a:latin typeface="Yu Gothic" panose="020B0400000000000000" pitchFamily="34" charset="-128"/>
               <a:ea typeface="Yu Gothic" panose="020B0400000000000000" pitchFamily="34" charset="-128"/>
               <a:sym typeface="Wingdings" panose="05000000000000000000" pitchFamily="2" charset="2"/>
@@ -4443,7 +4693,7 @@
           <a:p>
             <a:pPr lvl="1"/>
             <a:r>
-              <a:rPr lang="en-US" dirty="0">
+              <a:rPr lang="en-US">
                 <a:latin typeface="Yu Gothic" panose="020B0400000000000000" pitchFamily="34" charset="-128"/>
                 <a:ea typeface="Yu Gothic" panose="020B0400000000000000" pitchFamily="34" charset="-128"/>
                 <a:sym typeface="Wingdings" panose="05000000000000000000" pitchFamily="2" charset="2"/>
@@ -4454,7 +4704,7 @@
           <a:p>
             <a:pPr lvl="1"/>
             <a:r>
-              <a:rPr lang="en-US" dirty="0">
+              <a:rPr lang="en-US">
                 <a:latin typeface="Yu Gothic" panose="020B0400000000000000" pitchFamily="34" charset="-128"/>
                 <a:ea typeface="Yu Gothic" panose="020B0400000000000000" pitchFamily="34" charset="-128"/>
                 <a:sym typeface="Wingdings" panose="05000000000000000000" pitchFamily="2" charset="2"/>
@@ -4465,7 +4715,7 @@
           <a:p>
             <a:pPr lvl="2"/>
             <a:r>
-              <a:rPr lang="en-US" dirty="0">
+              <a:rPr lang="en-US">
                 <a:latin typeface="Yu Gothic" panose="020B0400000000000000" pitchFamily="34" charset="-128"/>
                 <a:ea typeface="Yu Gothic" panose="020B0400000000000000" pitchFamily="34" charset="-128"/>
                 <a:sym typeface="Wingdings" panose="05000000000000000000" pitchFamily="2" charset="2"/>
@@ -4476,37 +4726,24 @@
           <a:p>
             <a:pPr lvl="1"/>
             <a:r>
-              <a:rPr lang="en-US" dirty="0">
-                <a:latin typeface="Yu Gothic" panose="020B0400000000000000" pitchFamily="34" charset="-128"/>
-                <a:ea typeface="Yu Gothic" panose="020B0400000000000000" pitchFamily="34" charset="-128"/>
-                <a:sym typeface="Wingdings" panose="05000000000000000000" pitchFamily="2" charset="2"/>
-              </a:rPr>
-              <a:t>Loss of fluctuating selection</a:t>
-            </a:r>
-          </a:p>
-          <a:p>
-            <a:pPr lvl="1"/>
-            <a:r>
-              <a:rPr lang="en-US" dirty="0">
-                <a:latin typeface="Yu Gothic" panose="020B0400000000000000" pitchFamily="34" charset="-128"/>
-                <a:ea typeface="Yu Gothic" panose="020B0400000000000000" pitchFamily="34" charset="-128"/>
-                <a:sym typeface="Wingdings" panose="05000000000000000000" pitchFamily="2" charset="2"/>
-              </a:rPr>
-              <a:t>Human demography </a:t>
-            </a:r>
-            <a:r>
               <a:rPr lang="en-US">
                 <a:latin typeface="Yu Gothic" panose="020B0400000000000000" pitchFamily="34" charset="-128"/>
                 <a:ea typeface="Yu Gothic" panose="020B0400000000000000" pitchFamily="34" charset="-128"/>
                 <a:sym typeface="Wingdings" panose="05000000000000000000" pitchFamily="2" charset="2"/>
               </a:rPr>
-              <a:t> bottleneck</a:t>
-            </a:r>
-            <a:endParaRPr lang="en-US" dirty="0">
-              <a:latin typeface="Yu Gothic" panose="020B0400000000000000" pitchFamily="34" charset="-128"/>
-              <a:ea typeface="Yu Gothic" panose="020B0400000000000000" pitchFamily="34" charset="-128"/>
-              <a:sym typeface="Wingdings" panose="05000000000000000000" pitchFamily="2" charset="2"/>
-            </a:endParaRPr>
+              <a:t>Loss of fluctuating selection – Joanna Masel</a:t>
+            </a:r>
+          </a:p>
+          <a:p>
+            <a:pPr lvl="1"/>
+            <a:r>
+              <a:rPr lang="en-US">
+                <a:latin typeface="Yu Gothic" panose="020B0400000000000000" pitchFamily="34" charset="-128"/>
+                <a:ea typeface="Yu Gothic" panose="020B0400000000000000" pitchFamily="34" charset="-128"/>
+                <a:sym typeface="Wingdings" panose="05000000000000000000" pitchFamily="2" charset="2"/>
+              </a:rPr>
+              <a:t>Human demography  bottleneck</a:t>
+            </a:r>
           </a:p>
         </p:txBody>
       </p:sp>
@@ -4545,7 +4782,7 @@
           <p:cNvPr id="2" name="Title 1">
             <a:extLst>
               <a:ext uri="{FF2B5EF4-FFF2-40B4-BE49-F238E27FC236}">
-                <a16:creationId xmlns:a16="http://schemas.microsoft.com/office/drawing/2014/main" id="{8B99FEC6-73D8-4766-8334-339FDD458323}"/>
+                <a16:creationId xmlns:a16="http://schemas.microsoft.com/office/drawing/2014/main" id="{CE2DDACF-297A-31E1-413C-2D7FE1742111}"/>
               </a:ext>
             </a:extLst>
           </p:cNvPr>
@@ -4562,8 +4799,12 @@
           <a:lstStyle/>
           <a:p>
             <a:r>
-              <a:rPr lang="en-US"/>
-              <a:t>//TODO</a:t>
+              <a:rPr lang="en-US" err="1"/>
+              <a:t>Downsampling</a:t>
+            </a:r>
+            <a:r>
+              <a:rPr lang="en-US"/>
+              <a:t> pipeline</a:t>
             </a:r>
           </a:p>
         </p:txBody>
@@ -4573,7 +4814,7 @@
           <p:cNvPr id="3" name="Content Placeholder 2">
             <a:extLst>
               <a:ext uri="{FF2B5EF4-FFF2-40B4-BE49-F238E27FC236}">
-                <a16:creationId xmlns:a16="http://schemas.microsoft.com/office/drawing/2014/main" id="{AADD84A0-4056-4C50-9D26-2BA6AE9D454C}"/>
+                <a16:creationId xmlns:a16="http://schemas.microsoft.com/office/drawing/2014/main" id="{CF063477-FE77-35A8-85AB-DA766C6E6801}"/>
               </a:ext>
             </a:extLst>
           </p:cNvPr>
@@ -4586,17 +4827,771 @@
         </p:nvSpPr>
         <p:spPr/>
         <p:txBody>
-          <a:bodyPr>
-            <a:normAutofit/>
+          <a:bodyPr/>
+          <a:lstStyle/>
+          <a:p>
+            <a:pPr marL="514350" indent="-514350">
+              <a:buFont typeface="+mj-lt"/>
+              <a:buAutoNum type="arabicPeriod"/>
+            </a:pPr>
+            <a:r>
+              <a:rPr lang="en-US"/>
+              <a:t>Load core genes </a:t>
+            </a:r>
+            <a:r>
+              <a:rPr lang="en-US">
+                <a:sym typeface="Wingdings" panose="05000000000000000000" pitchFamily="2" charset="2"/>
+              </a:rPr>
+              <a:t> gene present in &gt;= 90% of samples</a:t>
+            </a:r>
+            <a:endParaRPr lang="en-US"/>
+          </a:p>
+          <a:p>
+            <a:pPr marL="514350" indent="-514350">
+              <a:buFont typeface="+mj-lt"/>
+              <a:buAutoNum type="arabicPeriod"/>
+            </a:pPr>
+            <a:r>
+              <a:rPr lang="en-US"/>
+              <a:t>Pre-compute substitution rate for species</a:t>
+            </a:r>
+          </a:p>
+          <a:p>
+            <a:pPr marL="514350" indent="-514350">
+              <a:buFont typeface="+mj-lt"/>
+              <a:buAutoNum type="arabicPeriod"/>
+            </a:pPr>
+            <a:r>
+              <a:rPr lang="en-US"/>
+              <a:t>Identify largest clade for clade control</a:t>
+            </a:r>
+          </a:p>
+          <a:p>
+            <a:pPr marL="514350" indent="-514350">
+              <a:buFont typeface="+mj-lt"/>
+              <a:buAutoNum type="arabicPeriod"/>
+            </a:pPr>
+            <a:r>
+              <a:rPr lang="en-US"/>
+              <a:t>Parse SNPs with MIDAS</a:t>
+            </a:r>
+          </a:p>
+          <a:p>
+            <a:pPr marL="971550" lvl="1" indent="-514350">
+              <a:buFont typeface="+mj-lt"/>
+              <a:buAutoNum type="arabicPeriod"/>
+            </a:pPr>
+            <a:r>
+              <a:rPr lang="en-US"/>
+              <a:t>Exclude nonsynonymous SNPs</a:t>
+            </a:r>
+          </a:p>
+          <a:p>
+            <a:pPr marL="514350" indent="-514350">
+              <a:buFont typeface="+mj-lt"/>
+              <a:buAutoNum type="arabicPeriod"/>
+            </a:pPr>
+            <a:r>
+              <a:rPr lang="en-US"/>
+              <a:t>Compute allele count for synonymous variants in each gene from core genes</a:t>
+            </a:r>
+          </a:p>
+          <a:p>
+            <a:pPr marL="514350" indent="-514350">
+              <a:buFont typeface="+mj-lt"/>
+              <a:buAutoNum type="arabicPeriod"/>
+            </a:pPr>
+            <a:r>
+              <a:rPr lang="en-US"/>
+              <a:t>Compute synonymous SFS</a:t>
+            </a:r>
+          </a:p>
+        </p:txBody>
+      </p:sp>
+    </p:spTree>
+    <p:extLst>
+      <p:ext uri="{BB962C8B-B14F-4D97-AF65-F5344CB8AC3E}">
+        <p14:creationId xmlns:p14="http://schemas.microsoft.com/office/powerpoint/2010/main" val="3721153668"/>
+      </p:ext>
+    </p:extLst>
+  </p:cSld>
+  <p:clrMapOvr>
+    <a:masterClrMapping/>
+  </p:clrMapOvr>
+</p:sld>
+</file>
+
+<file path=ppt/slides/slide5.xml><?xml version="1.0" encoding="utf-8"?>
+<p:sld xmlns:a="http://schemas.openxmlformats.org/drawingml/2006/main" xmlns:r="http://schemas.openxmlformats.org/officeDocument/2006/relationships" xmlns:p="http://schemas.openxmlformats.org/presentationml/2006/main">
+  <p:cSld>
+    <p:spTree>
+      <p:nvGrpSpPr>
+        <p:cNvPr id="1" name=""/>
+        <p:cNvGrpSpPr/>
+        <p:nvPr/>
+      </p:nvGrpSpPr>
+      <p:grpSpPr>
+        <a:xfrm>
+          <a:off x="0" y="0"/>
+          <a:ext cx="0" cy="0"/>
+          <a:chOff x="0" y="0"/>
+          <a:chExt cx="0" cy="0"/>
+        </a:xfrm>
+      </p:grpSpPr>
+      <p:pic>
+        <p:nvPicPr>
+          <p:cNvPr id="11" name="Picture 10">
+            <a:extLst>
+              <a:ext uri="{FF2B5EF4-FFF2-40B4-BE49-F238E27FC236}">
+                <a16:creationId xmlns:a16="http://schemas.microsoft.com/office/drawing/2014/main" id="{B5839E71-1AA0-1CAB-1C77-A648BAEB41D1}"/>
+              </a:ext>
+            </a:extLst>
+          </p:cNvPr>
+          <p:cNvPicPr>
+            <a:picLocks noChangeAspect="1"/>
+          </p:cNvPicPr>
+          <p:nvPr/>
+        </p:nvPicPr>
+        <p:blipFill>
+          <a:blip r:embed="rId2"/>
+          <a:stretch>
+            <a:fillRect/>
+          </a:stretch>
+        </p:blipFill>
+        <p:spPr>
+          <a:xfrm>
+            <a:off x="1050436" y="1957510"/>
+            <a:ext cx="6789128" cy="3397518"/>
+          </a:xfrm>
+          <a:prstGeom prst="rect">
+            <a:avLst/>
+          </a:prstGeom>
+        </p:spPr>
+      </p:pic>
+      <p:sp>
+        <p:nvSpPr>
+          <p:cNvPr id="2" name="Title 1">
+            <a:extLst>
+              <a:ext uri="{FF2B5EF4-FFF2-40B4-BE49-F238E27FC236}">
+                <a16:creationId xmlns:a16="http://schemas.microsoft.com/office/drawing/2014/main" id="{C819B54B-2127-BF9E-C506-AFCFAA6D79E3}"/>
+              </a:ext>
+            </a:extLst>
+          </p:cNvPr>
+          <p:cNvSpPr>
+            <a:spLocks noGrp="1"/>
+          </p:cNvSpPr>
+          <p:nvPr>
+            <p:ph type="title"/>
+          </p:nvPr>
+        </p:nvSpPr>
+        <p:spPr/>
+        <p:txBody>
+          <a:bodyPr/>
+          <a:lstStyle/>
+          <a:p>
+            <a:r>
+              <a:rPr lang="en-US"/>
+              <a:t>Preliminary Results (B. Thetaiotaomicron)</a:t>
+            </a:r>
+          </a:p>
+        </p:txBody>
+      </p:sp>
+      <p:graphicFrame>
+        <p:nvGraphicFramePr>
+          <p:cNvPr id="7" name="Table 4">
+            <a:extLst>
+              <a:ext uri="{FF2B5EF4-FFF2-40B4-BE49-F238E27FC236}">
+                <a16:creationId xmlns:a16="http://schemas.microsoft.com/office/drawing/2014/main" id="{130249C3-728E-D98F-C94F-EB7F250C92FE}"/>
+              </a:ext>
+            </a:extLst>
+          </p:cNvPr>
+          <p:cNvGraphicFramePr>
+            <a:graphicFrameLocks/>
+          </p:cNvGraphicFramePr>
+          <p:nvPr>
+            <p:extLst>
+              <p:ext uri="{D42A27DB-BD31-4B8C-83A1-F6EECF244321}">
+                <p14:modId xmlns:p14="http://schemas.microsoft.com/office/powerpoint/2010/main" val="660835483"/>
+              </p:ext>
+            </p:extLst>
+          </p:nvPr>
+        </p:nvGraphicFramePr>
+        <p:xfrm>
+          <a:off x="6873240" y="4275602"/>
+          <a:ext cx="5318760" cy="1483360"/>
+        </p:xfrm>
+        <a:graphic>
+          <a:graphicData uri="http://schemas.openxmlformats.org/drawingml/2006/table">
+            <a:tbl>
+              <a:tblPr firstRow="1" bandRow="1">
+                <a:tableStyleId>{073A0DAA-6AF3-43AB-8588-CEC1D06C72B9}</a:tableStyleId>
+              </a:tblPr>
+              <a:tblGrid>
+                <a:gridCol w="1772920">
+                  <a:extLst>
+                    <a:ext uri="{9D8B030D-6E8A-4147-A177-3AD203B41FA5}">
+                      <a16:colId xmlns:a16="http://schemas.microsoft.com/office/drawing/2014/main" val="641599486"/>
+                    </a:ext>
+                  </a:extLst>
+                </a:gridCol>
+                <a:gridCol w="1772920">
+                  <a:extLst>
+                    <a:ext uri="{9D8B030D-6E8A-4147-A177-3AD203B41FA5}">
+                      <a16:colId xmlns:a16="http://schemas.microsoft.com/office/drawing/2014/main" val="642518104"/>
+                    </a:ext>
+                  </a:extLst>
+                </a:gridCol>
+                <a:gridCol w="1772920">
+                  <a:extLst>
+                    <a:ext uri="{9D8B030D-6E8A-4147-A177-3AD203B41FA5}">
+                      <a16:colId xmlns:a16="http://schemas.microsoft.com/office/drawing/2014/main" val="2561366993"/>
+                    </a:ext>
+                  </a:extLst>
+                </a:gridCol>
+              </a:tblGrid>
+              <a:tr h="370840">
+                <a:tc>
+                  <a:txBody>
+                    <a:bodyPr/>
+                    <a:lstStyle/>
+                    <a:p>
+                      <a:endParaRPr lang="en-US"/>
+                    </a:p>
+                  </a:txBody>
+                  <a:tcPr/>
+                </a:tc>
+                <a:tc>
+                  <a:txBody>
+                    <a:bodyPr/>
+                    <a:lstStyle/>
+                    <a:p>
+                      <a:r>
+                        <a:rPr lang="en-US"/>
+                        <a:t>One Epoch</a:t>
+                      </a:r>
+                    </a:p>
+                  </a:txBody>
+                  <a:tcPr/>
+                </a:tc>
+                <a:tc>
+                  <a:txBody>
+                    <a:bodyPr/>
+                    <a:lstStyle/>
+                    <a:p>
+                      <a:r>
+                        <a:rPr lang="en-US"/>
+                        <a:t>Two Epoch</a:t>
+                      </a:r>
+                    </a:p>
+                  </a:txBody>
+                  <a:tcPr/>
+                </a:tc>
+                <a:extLst>
+                  <a:ext uri="{0D108BD9-81ED-4DB2-BD59-A6C34878D82A}">
+                    <a16:rowId xmlns:a16="http://schemas.microsoft.com/office/drawing/2014/main" val="2679151076"/>
+                  </a:ext>
+                </a:extLst>
+              </a:tr>
+              <a:tr h="370840">
+                <a:tc>
+                  <a:txBody>
+                    <a:bodyPr/>
+                    <a:lstStyle/>
+                    <a:p>
+                      <a:r>
+                        <a:rPr lang="en-US"/>
+                        <a:t>LL</a:t>
+                      </a:r>
+                    </a:p>
+                  </a:txBody>
+                  <a:tcPr/>
+                </a:tc>
+                <a:tc>
+                  <a:txBody>
+                    <a:bodyPr/>
+                    <a:lstStyle/>
+                    <a:p>
+                      <a:r>
+                        <a:rPr lang="en-US"/>
+                        <a:t>-72.7526626915</a:t>
+                      </a:r>
+                    </a:p>
+                  </a:txBody>
+                  <a:tcPr/>
+                </a:tc>
+                <a:tc>
+                  <a:txBody>
+                    <a:bodyPr/>
+                    <a:lstStyle/>
+                    <a:p>
+                      <a:r>
+                        <a:rPr lang="en-US"/>
+                        <a:t>-67.7389287184</a:t>
+                      </a:r>
+                    </a:p>
+                  </a:txBody>
+                  <a:tcPr/>
+                </a:tc>
+                <a:extLst>
+                  <a:ext uri="{0D108BD9-81ED-4DB2-BD59-A6C34878D82A}">
+                    <a16:rowId xmlns:a16="http://schemas.microsoft.com/office/drawing/2014/main" val="2222837509"/>
+                  </a:ext>
+                </a:extLst>
+              </a:tr>
+              <a:tr h="370840">
+                <a:tc>
+                  <a:txBody>
+                    <a:bodyPr/>
+                    <a:lstStyle/>
+                    <a:p>
+                      <a:r>
+                        <a:rPr lang="en-US"/>
+                        <a:t>Nu </a:t>
+                      </a:r>
+                    </a:p>
+                  </a:txBody>
+                  <a:tcPr/>
+                </a:tc>
+                <a:tc>
+                  <a:txBody>
+                    <a:bodyPr/>
+                    <a:lstStyle/>
+                    <a:p>
+                      <a:r>
+                        <a:rPr lang="en-US"/>
+                        <a:t>N/A</a:t>
+                      </a:r>
+                    </a:p>
+                  </a:txBody>
+                  <a:tcPr/>
+                </a:tc>
+                <a:tc>
+                  <a:txBody>
+                    <a:bodyPr/>
+                    <a:lstStyle/>
+                    <a:p>
+                      <a:pPr marL="0" marR="0" lvl="0" indent="0" algn="l" defTabSz="914400" rtl="0" eaLnBrk="1" fontAlgn="auto" latinLnBrk="0" hangingPunct="1">
+                        <a:lnSpc>
+                          <a:spcPct val="100000"/>
+                        </a:lnSpc>
+                        <a:spcBef>
+                          <a:spcPts val="0"/>
+                        </a:spcBef>
+                        <a:spcAft>
+                          <a:spcPts val="0"/>
+                        </a:spcAft>
+                        <a:buClrTx/>
+                        <a:buSzTx/>
+                        <a:buFontTx/>
+                        <a:buNone/>
+                        <a:tabLst/>
+                        <a:defRPr/>
+                      </a:pPr>
+                      <a:r>
+                        <a:rPr lang="en-US"/>
+                        <a:t>4.38198542e-02</a:t>
+                      </a:r>
+                    </a:p>
+                  </a:txBody>
+                  <a:tcPr/>
+                </a:tc>
+                <a:extLst>
+                  <a:ext uri="{0D108BD9-81ED-4DB2-BD59-A6C34878D82A}">
+                    <a16:rowId xmlns:a16="http://schemas.microsoft.com/office/drawing/2014/main" val="1420133663"/>
+                  </a:ext>
+                </a:extLst>
+              </a:tr>
+              <a:tr h="370840">
+                <a:tc>
+                  <a:txBody>
+                    <a:bodyPr/>
+                    <a:lstStyle/>
+                    <a:p>
+                      <a:r>
+                        <a:rPr lang="en-US"/>
+                        <a:t>T in years</a:t>
+                      </a:r>
+                    </a:p>
+                  </a:txBody>
+                  <a:tcPr/>
+                </a:tc>
+                <a:tc>
+                  <a:txBody>
+                    <a:bodyPr/>
+                    <a:lstStyle/>
+                    <a:p>
+                      <a:r>
+                        <a:rPr lang="en-US"/>
+                        <a:t>N/A</a:t>
+                      </a:r>
+                    </a:p>
+                  </a:txBody>
+                  <a:tcPr/>
+                </a:tc>
+                <a:tc>
+                  <a:txBody>
+                    <a:bodyPr/>
+                    <a:lstStyle/>
+                    <a:p>
+                      <a:r>
+                        <a:rPr lang="en-US"/>
+                        <a:t>2.5432E+04</a:t>
+                      </a:r>
+                    </a:p>
+                  </a:txBody>
+                  <a:tcPr/>
+                </a:tc>
+                <a:extLst>
+                  <a:ext uri="{0D108BD9-81ED-4DB2-BD59-A6C34878D82A}">
+                    <a16:rowId xmlns:a16="http://schemas.microsoft.com/office/drawing/2014/main" val="1226658601"/>
+                  </a:ext>
+                </a:extLst>
+              </a:tr>
+            </a:tbl>
+          </a:graphicData>
+        </a:graphic>
+      </p:graphicFrame>
+      <p:sp>
+        <p:nvSpPr>
+          <p:cNvPr id="3" name="TextBox 2">
+            <a:extLst>
+              <a:ext uri="{FF2B5EF4-FFF2-40B4-BE49-F238E27FC236}">
+                <a16:creationId xmlns:a16="http://schemas.microsoft.com/office/drawing/2014/main" id="{8C9F757C-AB19-0D9E-C6B9-29912913BE04}"/>
+              </a:ext>
+            </a:extLst>
+          </p:cNvPr>
+          <p:cNvSpPr txBox="1"/>
+          <p:nvPr/>
+        </p:nvSpPr>
+        <p:spPr>
+          <a:xfrm>
+            <a:off x="8051800" y="1409700"/>
+            <a:ext cx="4140200" cy="1754326"/>
+          </a:xfrm>
+          <a:prstGeom prst="rect">
+            <a:avLst/>
+          </a:prstGeom>
+          <a:noFill/>
+        </p:spPr>
+        <p:txBody>
+          <a:bodyPr wrap="square" rtlCol="0">
+            <a:spAutoFit/>
           </a:bodyPr>
           <a:lstStyle/>
           <a:p>
-            <a:endParaRPr lang="en-US" dirty="0"/>
-          </a:p>
-        </p:txBody>
-      </p:sp>
-      <mc:AlternateContent xmlns:mc="http://schemas.openxmlformats.org/markup-compatibility/2006" xmlns:p14="http://schemas.microsoft.com/office/powerpoint/2010/main">
-        <mc:Choice Requires="p14">
+            <a:r>
+              <a:rPr lang="en-US"/>
+              <a:t>Other ways to show SFS:</a:t>
+            </a:r>
+          </a:p>
+          <a:p>
+            <a:pPr marL="285750" indent="-285750">
+              <a:buFont typeface="Arial" panose="020B0604020202020204" pitchFamily="34" charset="0"/>
+              <a:buChar char="•"/>
+            </a:pPr>
+            <a:r>
+              <a:rPr lang="en-US"/>
+              <a:t>Delta</a:t>
+            </a:r>
+          </a:p>
+          <a:p>
+            <a:pPr marL="285750" indent="-285750">
+              <a:buFont typeface="Arial" panose="020B0604020202020204" pitchFamily="34" charset="0"/>
+              <a:buChar char="•"/>
+            </a:pPr>
+            <a:r>
+              <a:rPr lang="en-US"/>
+              <a:t>Logscale on Y-axis</a:t>
+            </a:r>
+          </a:p>
+          <a:p>
+            <a:pPr marL="285750" indent="-285750">
+              <a:buFont typeface="Arial" panose="020B0604020202020204" pitchFamily="34" charset="0"/>
+              <a:buChar char="•"/>
+            </a:pPr>
+            <a:r>
+              <a:rPr lang="en-US"/>
+              <a:t>Maybe bin common variants together, e.g., everything greater than 10 (also shrinks plot)</a:t>
+            </a:r>
+          </a:p>
+        </p:txBody>
+      </p:sp>
+    </p:spTree>
+    <p:extLst>
+      <p:ext uri="{BB962C8B-B14F-4D97-AF65-F5344CB8AC3E}">
+        <p14:creationId xmlns:p14="http://schemas.microsoft.com/office/powerpoint/2010/main" val="3895373339"/>
+      </p:ext>
+    </p:extLst>
+  </p:cSld>
+  <p:clrMapOvr>
+    <a:masterClrMapping/>
+  </p:clrMapOvr>
+</p:sld>
+</file>
+
+<file path=ppt/slides/slide6.xml><?xml version="1.0" encoding="utf-8"?>
+<p:sld xmlns:a="http://schemas.openxmlformats.org/drawingml/2006/main" xmlns:r="http://schemas.openxmlformats.org/officeDocument/2006/relationships" xmlns:p="http://schemas.openxmlformats.org/presentationml/2006/main">
+  <p:cSld>
+    <p:spTree>
+      <p:nvGrpSpPr>
+        <p:cNvPr id="1" name=""/>
+        <p:cNvGrpSpPr/>
+        <p:nvPr/>
+      </p:nvGrpSpPr>
+      <p:grpSpPr>
+        <a:xfrm>
+          <a:off x="0" y="0"/>
+          <a:ext cx="0" cy="0"/>
+          <a:chOff x="0" y="0"/>
+          <a:chExt cx="0" cy="0"/>
+        </a:xfrm>
+      </p:grpSpPr>
+      <p:sp>
+        <p:nvSpPr>
+          <p:cNvPr id="2" name="Title 1">
+            <a:extLst>
+              <a:ext uri="{FF2B5EF4-FFF2-40B4-BE49-F238E27FC236}">
+                <a16:creationId xmlns:a16="http://schemas.microsoft.com/office/drawing/2014/main" id="{6DE57635-0150-BECC-C889-D52CC577CB25}"/>
+              </a:ext>
+            </a:extLst>
+          </p:cNvPr>
+          <p:cNvSpPr>
+            <a:spLocks noGrp="1"/>
+          </p:cNvSpPr>
+          <p:nvPr>
+            <p:ph type="title"/>
+          </p:nvPr>
+        </p:nvSpPr>
+        <p:spPr/>
+        <p:txBody>
+          <a:bodyPr/>
+          <a:lstStyle/>
+          <a:p>
+            <a:r>
+              <a:rPr lang="en-US">
+                <a:latin typeface="Yu Gothic" panose="020B0400000000000000" pitchFamily="34" charset="-128"/>
+                <a:ea typeface="Yu Gothic" panose="020B0400000000000000" pitchFamily="34" charset="-128"/>
+              </a:rPr>
+              <a:t>Preliminary Results (B. Thetaiotaomicron)</a:t>
+            </a:r>
+          </a:p>
+        </p:txBody>
+      </p:sp>
+      <p:sp>
+        <p:nvSpPr>
+          <p:cNvPr id="6" name="Content Placeholder 5">
+            <a:extLst>
+              <a:ext uri="{FF2B5EF4-FFF2-40B4-BE49-F238E27FC236}">
+                <a16:creationId xmlns:a16="http://schemas.microsoft.com/office/drawing/2014/main" id="{E9FAF2D6-9667-5925-A68F-F749AA360964}"/>
+              </a:ext>
+            </a:extLst>
+          </p:cNvPr>
+          <p:cNvSpPr>
+            <a:spLocks noGrp="1"/>
+          </p:cNvSpPr>
+          <p:nvPr>
+            <p:ph idx="1"/>
+          </p:nvPr>
+        </p:nvSpPr>
+        <p:spPr/>
+        <p:txBody>
+          <a:bodyPr/>
+          <a:lstStyle/>
+          <a:p>
+            <a:r>
+              <a:rPr lang="en-US"/>
+              <a:t>One epoch overestimates rare variants</a:t>
+            </a:r>
+          </a:p>
+          <a:p>
+            <a:r>
+              <a:rPr lang="en-US"/>
+              <a:t>Two epoch is closer to empirical data, still suggests contraction</a:t>
+            </a:r>
+          </a:p>
+          <a:p>
+            <a:pPr lvl="1"/>
+            <a:r>
+              <a:rPr lang="en-US"/>
+              <a:t>Time range is a little higher than estimated from non-</a:t>
+            </a:r>
+            <a:r>
+              <a:rPr lang="en-US" err="1"/>
+              <a:t>downsampled</a:t>
+            </a:r>
+            <a:r>
+              <a:rPr lang="en-US"/>
+              <a:t> data</a:t>
+            </a:r>
+          </a:p>
+          <a:p>
+            <a:pPr lvl="1"/>
+            <a:r>
+              <a:rPr lang="en-US"/>
+              <a:t>Contraction is less severe here in terms of Nu params</a:t>
+            </a:r>
+          </a:p>
+        </p:txBody>
+      </p:sp>
+    </p:spTree>
+    <p:extLst>
+      <p:ext uri="{BB962C8B-B14F-4D97-AF65-F5344CB8AC3E}">
+        <p14:creationId xmlns:p14="http://schemas.microsoft.com/office/powerpoint/2010/main" val="3780593580"/>
+      </p:ext>
+    </p:extLst>
+  </p:cSld>
+  <p:clrMapOvr>
+    <a:masterClrMapping/>
+  </p:clrMapOvr>
+</p:sld>
+</file>
+
+<file path=ppt/slides/slide7.xml><?xml version="1.0" encoding="utf-8"?>
+<p:sld xmlns:a="http://schemas.openxmlformats.org/drawingml/2006/main" xmlns:r="http://schemas.openxmlformats.org/officeDocument/2006/relationships" xmlns:p="http://schemas.openxmlformats.org/presentationml/2006/main">
+  <p:cSld>
+    <p:spTree>
+      <p:nvGrpSpPr>
+        <p:cNvPr id="1" name=""/>
+        <p:cNvGrpSpPr/>
+        <p:nvPr/>
+      </p:nvGrpSpPr>
+      <p:grpSpPr>
+        <a:xfrm>
+          <a:off x="0" y="0"/>
+          <a:ext cx="0" cy="0"/>
+          <a:chOff x="0" y="0"/>
+          <a:chExt cx="0" cy="0"/>
+        </a:xfrm>
+      </p:grpSpPr>
+      <p:sp>
+        <p:nvSpPr>
+          <p:cNvPr id="2" name="Title 1">
+            <a:extLst>
+              <a:ext uri="{FF2B5EF4-FFF2-40B4-BE49-F238E27FC236}">
+                <a16:creationId xmlns:a16="http://schemas.microsoft.com/office/drawing/2014/main" id="{8B99FEC6-73D8-4766-8334-339FDD458323}"/>
+              </a:ext>
+            </a:extLst>
+          </p:cNvPr>
+          <p:cNvSpPr>
+            <a:spLocks noGrp="1"/>
+          </p:cNvSpPr>
+          <p:nvPr>
+            <p:ph type="title"/>
+          </p:nvPr>
+        </p:nvSpPr>
+        <p:spPr/>
+        <p:txBody>
+          <a:bodyPr/>
+          <a:lstStyle/>
+          <a:p>
+            <a:r>
+              <a:rPr lang="en-US"/>
+              <a:t>//TODO</a:t>
+            </a:r>
+          </a:p>
+        </p:txBody>
+      </p:sp>
+      <p:sp>
+        <p:nvSpPr>
+          <p:cNvPr id="3" name="Content Placeholder 2">
+            <a:extLst>
+              <a:ext uri="{FF2B5EF4-FFF2-40B4-BE49-F238E27FC236}">
+                <a16:creationId xmlns:a16="http://schemas.microsoft.com/office/drawing/2014/main" id="{AADD84A0-4056-4C50-9D26-2BA6AE9D454C}"/>
+              </a:ext>
+            </a:extLst>
+          </p:cNvPr>
+          <p:cNvSpPr>
+            <a:spLocks noGrp="1"/>
+          </p:cNvSpPr>
+          <p:nvPr>
+            <p:ph idx="1"/>
+          </p:nvPr>
+        </p:nvSpPr>
+        <p:spPr/>
+        <p:txBody>
+          <a:bodyPr>
+            <a:normAutofit lnSpcReduction="10000"/>
+          </a:bodyPr>
+          <a:lstStyle/>
+          <a:p>
+            <a:r>
+              <a:rPr lang="en-US"/>
+              <a:t>How many hosts are </a:t>
+            </a:r>
+            <a:r>
+              <a:rPr lang="en-US" err="1"/>
+              <a:t>quasiphaseable</a:t>
+            </a:r>
+            <a:r>
+              <a:rPr lang="en-US"/>
+              <a:t> for each species to determine appropriate number for </a:t>
+            </a:r>
+            <a:r>
+              <a:rPr lang="en-US" err="1"/>
+              <a:t>downsampling</a:t>
+            </a:r>
+            <a:endParaRPr lang="en-US"/>
+          </a:p>
+          <a:p>
+            <a:r>
+              <a:rPr lang="en-US"/>
+              <a:t>Check </a:t>
+            </a:r>
+            <a:r>
+              <a:rPr lang="en-US" err="1"/>
+              <a:t>largest_clade_samples</a:t>
+            </a:r>
+            <a:r>
+              <a:rPr lang="en-US"/>
+              <a:t> on line 508 of `compute_downsampled_sfs.py`</a:t>
+            </a:r>
+          </a:p>
+          <a:p>
+            <a:pPr lvl="1"/>
+            <a:r>
+              <a:rPr lang="en-US"/>
+              <a:t>Check if refs and alts are correctly computed</a:t>
+            </a:r>
+          </a:p>
+          <a:p>
+            <a:pPr lvl="1"/>
+            <a:endParaRPr lang="en-US"/>
+          </a:p>
+          <a:p>
+            <a:pPr lvl="1"/>
+            <a:endParaRPr lang="en-US"/>
+          </a:p>
+          <a:p>
+            <a:r>
+              <a:rPr lang="en-US"/>
+              <a:t>Long term:</a:t>
+            </a:r>
+          </a:p>
+          <a:p>
+            <a:pPr lvl="1"/>
+            <a:r>
+              <a:rPr lang="en-US"/>
+              <a:t>Confidence Intervals</a:t>
+            </a:r>
+          </a:p>
+          <a:p>
+            <a:pPr lvl="2"/>
+            <a:r>
+              <a:rPr lang="en-US"/>
+              <a:t>Some sort of bootstrapping approach</a:t>
+            </a:r>
+          </a:p>
+          <a:p>
+            <a:pPr lvl="1"/>
+            <a:r>
+              <a:rPr lang="en-US"/>
+              <a:t>Oral data (consult Daisy + Brian)</a:t>
+            </a:r>
+          </a:p>
+        </p:txBody>
+      </p:sp>
+      <mc:AlternateContent xmlns:mc="http://schemas.openxmlformats.org/markup-compatibility/2006">
+        <mc:Choice xmlns:p14="http://schemas.microsoft.com/office/powerpoint/2010/main" Requires="p14">
           <p:contentPart p14:bwMode="auto" r:id="rId2">
             <p14:nvContentPartPr>
               <p14:cNvPr id="4" name="Ink 3">
@@ -4615,7 +5610,7 @@
             </p14:xfrm>
           </p:contentPart>
         </mc:Choice>
-        <mc:Fallback xmlns="">
+        <mc:Fallback>
           <p:pic>
             <p:nvPicPr>
               <p:cNvPr id="4" name="Ink 3">
@@ -4646,8 +5641,8 @@
           </p:pic>
         </mc:Fallback>
       </mc:AlternateContent>
-      <mc:AlternateContent xmlns:mc="http://schemas.openxmlformats.org/markup-compatibility/2006" xmlns:p14="http://schemas.microsoft.com/office/powerpoint/2010/main">
-        <mc:Choice Requires="p14">
+      <mc:AlternateContent xmlns:mc="http://schemas.openxmlformats.org/markup-compatibility/2006">
+        <mc:Choice xmlns:p14="http://schemas.microsoft.com/office/powerpoint/2010/main" Requires="p14">
           <p:contentPart p14:bwMode="auto" r:id="rId4">
             <p14:nvContentPartPr>
               <p14:cNvPr id="5" name="Ink 4">
@@ -4666,7 +5661,7 @@
             </p14:xfrm>
           </p:contentPart>
         </mc:Choice>
-        <mc:Fallback xmlns="">
+        <mc:Fallback>
           <p:pic>
             <p:nvPicPr>
               <p:cNvPr id="5" name="Ink 4">
@@ -4697,8 +5692,8 @@
           </p:pic>
         </mc:Fallback>
       </mc:AlternateContent>
-      <mc:AlternateContent xmlns:mc="http://schemas.openxmlformats.org/markup-compatibility/2006" xmlns:p14="http://schemas.microsoft.com/office/powerpoint/2010/main">
-        <mc:Choice Requires="p14">
+      <mc:AlternateContent xmlns:mc="http://schemas.openxmlformats.org/markup-compatibility/2006">
+        <mc:Choice xmlns:p14="http://schemas.microsoft.com/office/powerpoint/2010/main" Requires="p14">
           <p:contentPart p14:bwMode="auto" r:id="rId5">
             <p14:nvContentPartPr>
               <p14:cNvPr id="6" name="Ink 5">
@@ -4717,7 +5712,7 @@
             </p14:xfrm>
           </p:contentPart>
         </mc:Choice>
-        <mc:Fallback xmlns="">
+        <mc:Fallback>
           <p:pic>
             <p:nvPicPr>
               <p:cNvPr id="6" name="Ink 5">
@@ -4748,8 +5743,8 @@
           </p:pic>
         </mc:Fallback>
       </mc:AlternateContent>
-      <mc:AlternateContent xmlns:mc="http://schemas.openxmlformats.org/markup-compatibility/2006" xmlns:p14="http://schemas.microsoft.com/office/powerpoint/2010/main">
-        <mc:Choice Requires="p14">
+      <mc:AlternateContent xmlns:mc="http://schemas.openxmlformats.org/markup-compatibility/2006">
+        <mc:Choice xmlns:p14="http://schemas.microsoft.com/office/powerpoint/2010/main" Requires="p14">
           <p:contentPart p14:bwMode="auto" r:id="rId7">
             <p14:nvContentPartPr>
               <p14:cNvPr id="7" name="Ink 6">
@@ -4768,7 +5763,7 @@
             </p14:xfrm>
           </p:contentPart>
         </mc:Choice>
-        <mc:Fallback xmlns="">
+        <mc:Fallback>
           <p:pic>
             <p:nvPicPr>
               <p:cNvPr id="7" name="Ink 6">
@@ -4819,8 +5814,8 @@
             <a:chExt cx="360" cy="360"/>
           </a:xfrm>
         </p:grpSpPr>
-        <mc:AlternateContent xmlns:mc="http://schemas.openxmlformats.org/markup-compatibility/2006" xmlns:p14="http://schemas.microsoft.com/office/powerpoint/2010/main">
-          <mc:Choice Requires="p14">
+        <mc:AlternateContent xmlns:mc="http://schemas.openxmlformats.org/markup-compatibility/2006">
+          <mc:Choice xmlns:p14="http://schemas.microsoft.com/office/powerpoint/2010/main" Requires="p14">
             <p:contentPart p14:bwMode="auto" r:id="rId8">
               <p14:nvContentPartPr>
                 <p14:cNvPr id="8" name="Ink 7">
@@ -4839,7 +5834,7 @@
               </p14:xfrm>
             </p:contentPart>
           </mc:Choice>
-          <mc:Fallback xmlns="">
+          <mc:Fallback>
             <p:pic>
               <p:nvPicPr>
                 <p:cNvPr id="8" name="Ink 7">
@@ -4870,8 +5865,8 @@
             </p:pic>
           </mc:Fallback>
         </mc:AlternateContent>
-        <mc:AlternateContent xmlns:mc="http://schemas.openxmlformats.org/markup-compatibility/2006" xmlns:p14="http://schemas.microsoft.com/office/powerpoint/2010/main">
-          <mc:Choice Requires="p14">
+        <mc:AlternateContent xmlns:mc="http://schemas.openxmlformats.org/markup-compatibility/2006">
+          <mc:Choice xmlns:p14="http://schemas.microsoft.com/office/powerpoint/2010/main" Requires="p14">
             <p:contentPart p14:bwMode="auto" r:id="rId9">
               <p14:nvContentPartPr>
                 <p14:cNvPr id="9" name="Ink 8">
@@ -4890,7 +5885,7 @@
               </p14:xfrm>
             </p:contentPart>
           </mc:Choice>
-          <mc:Fallback xmlns="">
+          <mc:Fallback>
             <p:pic>
               <p:nvPicPr>
                 <p:cNvPr id="9" name="Ink 8">
@@ -4921,8 +5916,8 @@
             </p:pic>
           </mc:Fallback>
         </mc:AlternateContent>
-        <mc:AlternateContent xmlns:mc="http://schemas.openxmlformats.org/markup-compatibility/2006" xmlns:p14="http://schemas.microsoft.com/office/powerpoint/2010/main">
-          <mc:Choice Requires="p14">
+        <mc:AlternateContent xmlns:mc="http://schemas.openxmlformats.org/markup-compatibility/2006">
+          <mc:Choice xmlns:p14="http://schemas.microsoft.com/office/powerpoint/2010/main" Requires="p14">
             <p:contentPart p14:bwMode="auto" r:id="rId10">
               <p14:nvContentPartPr>
                 <p14:cNvPr id="10" name="Ink 9">
@@ -4941,7 +5936,7 @@
               </p14:xfrm>
             </p:contentPart>
           </mc:Choice>
-          <mc:Fallback xmlns="">
+          <mc:Fallback>
             <p:pic>
               <p:nvPicPr>
                 <p:cNvPr id="10" name="Ink 9">
@@ -4973,8 +5968,8 @@
           </mc:Fallback>
         </mc:AlternateContent>
       </p:grpSp>
-      <mc:AlternateContent xmlns:mc="http://schemas.openxmlformats.org/markup-compatibility/2006" xmlns:p14="http://schemas.microsoft.com/office/powerpoint/2010/main">
-        <mc:Choice Requires="p14">
+      <mc:AlternateContent xmlns:mc="http://schemas.openxmlformats.org/markup-compatibility/2006">
+        <mc:Choice xmlns:p14="http://schemas.microsoft.com/office/powerpoint/2010/main" Requires="p14">
           <p:contentPart p14:bwMode="auto" r:id="rId11">
             <p14:nvContentPartPr>
               <p14:cNvPr id="11" name="Ink 10">
@@ -4993,7 +5988,7 @@
             </p14:xfrm>
           </p:contentPart>
         </mc:Choice>
-        <mc:Fallback xmlns="">
+        <mc:Fallback>
           <p:pic>
             <p:nvPicPr>
               <p:cNvPr id="11" name="Ink 10">
@@ -5044,8 +6039,8 @@
             <a:chExt cx="360" cy="360"/>
           </a:xfrm>
         </p:grpSpPr>
-        <mc:AlternateContent xmlns:mc="http://schemas.openxmlformats.org/markup-compatibility/2006" xmlns:p14="http://schemas.microsoft.com/office/powerpoint/2010/main">
-          <mc:Choice Requires="p14">
+        <mc:AlternateContent xmlns:mc="http://schemas.openxmlformats.org/markup-compatibility/2006">
+          <mc:Choice xmlns:p14="http://schemas.microsoft.com/office/powerpoint/2010/main" Requires="p14">
             <p:contentPart p14:bwMode="auto" r:id="rId12">
               <p14:nvContentPartPr>
                 <p14:cNvPr id="12" name="Ink 11">
@@ -5064,7 +6059,7 @@
               </p14:xfrm>
             </p:contentPart>
           </mc:Choice>
-          <mc:Fallback xmlns="">
+          <mc:Fallback>
             <p:pic>
               <p:nvPicPr>
                 <p:cNvPr id="12" name="Ink 11">
@@ -5095,8 +6090,8 @@
             </p:pic>
           </mc:Fallback>
         </mc:AlternateContent>
-        <mc:AlternateContent xmlns:mc="http://schemas.openxmlformats.org/markup-compatibility/2006" xmlns:p14="http://schemas.microsoft.com/office/powerpoint/2010/main">
-          <mc:Choice Requires="p14">
+        <mc:AlternateContent xmlns:mc="http://schemas.openxmlformats.org/markup-compatibility/2006">
+          <mc:Choice xmlns:p14="http://schemas.microsoft.com/office/powerpoint/2010/main" Requires="p14">
             <p:contentPart p14:bwMode="auto" r:id="rId13">
               <p14:nvContentPartPr>
                 <p14:cNvPr id="13" name="Ink 12">
@@ -5115,7 +6110,7 @@
               </p14:xfrm>
             </p:contentPart>
           </mc:Choice>
-          <mc:Fallback xmlns="">
+          <mc:Fallback>
             <p:pic>
               <p:nvPicPr>
                 <p:cNvPr id="13" name="Ink 12">

</xml_diff>

<commit_message>
merge, downsampled outputs, MIDAS species step bugfix.
</commit_message>
<xml_diff>
--- a/Summary/20220624_microbiome_demographic_slides.pptx
+++ b/Summary/20220624_microbiome_demographic_slides.pptx
@@ -140,7 +140,6 @@
 <p1510:revInfo xmlns:a="http://schemas.openxmlformats.org/drawingml/2006/main" xmlns:r="http://schemas.openxmlformats.org/officeDocument/2006/relationships" xmlns:p1510="http://schemas.microsoft.com/office/powerpoint/2015/10/main">
   <p1510:revLst>
     <p1510:client id="{B2743461-8AA5-4D76-92E2-E503ABDB407D}" v="352" dt="2022-06-24T18:34:05.457"/>
-    <p1510:client id="{FB83F72D-C3DC-459E-A04A-1098E5266807}" v="434" dt="2022-06-24T18:45:56.259"/>
   </p1510:revLst>
 </p1510:revInfo>
 </file>
@@ -219,18 +218,18 @@
   <pc:docChgLst>
     <pc:chgData name="Jonathan Mah" userId="5261b2f2f3e51194" providerId="LiveId" clId="{B2743461-8AA5-4D76-92E2-E503ABDB407D}"/>
     <pc:docChg chg="undo custSel addSld delSld modSld modSection">
-      <pc:chgData name="Jonathan Mah" userId="5261b2f2f3e51194" providerId="LiveId" clId="{B2743461-8AA5-4D76-92E2-E503ABDB407D}" dt="2022-06-24T18:34:05.457" v="1723" actId="20577"/>
+      <pc:chgData name="Jonathan Mah" userId="5261b2f2f3e51194" providerId="LiveId" clId="{B2743461-8AA5-4D76-92E2-E503ABDB407D}" dt="2022-07-13T21:52:52.100" v="1729" actId="20577"/>
       <pc:docMkLst>
         <pc:docMk/>
       </pc:docMkLst>
       <pc:sldChg chg="modSp mod">
-        <pc:chgData name="Jonathan Mah" userId="5261b2f2f3e51194" providerId="LiveId" clId="{B2743461-8AA5-4D76-92E2-E503ABDB407D}" dt="2022-06-24T16:14:08.959" v="2" actId="20577"/>
+        <pc:chgData name="Jonathan Mah" userId="5261b2f2f3e51194" providerId="LiveId" clId="{B2743461-8AA5-4D76-92E2-E503ABDB407D}" dt="2022-07-13T21:52:52.100" v="1729" actId="20577"/>
         <pc:sldMkLst>
           <pc:docMk/>
           <pc:sldMk cId="1442538198" sldId="256"/>
         </pc:sldMkLst>
         <pc:spChg chg="mod">
-          <ac:chgData name="Jonathan Mah" userId="5261b2f2f3e51194" providerId="LiveId" clId="{B2743461-8AA5-4D76-92E2-E503ABDB407D}" dt="2022-06-24T16:14:08.959" v="2" actId="20577"/>
+          <ac:chgData name="Jonathan Mah" userId="5261b2f2f3e51194" providerId="LiveId" clId="{B2743461-8AA5-4D76-92E2-E503ABDB407D}" dt="2022-07-13T21:52:52.100" v="1729" actId="20577"/>
           <ac:spMkLst>
             <pc:docMk/>
             <pc:sldMk cId="1442538198" sldId="256"/>
@@ -803,7 +802,7 @@
           <a:p>
             <a:fld id="{2F446724-7A58-4020-9182-8374F0305DD3}" type="datetimeFigureOut">
               <a:rPr lang="en-US" smtClean="0"/>
-              <a:t>6/24/2022</a:t>
+              <a:t>7/13/2022</a:t>
             </a:fld>
             <a:endParaRPr lang="en-US"/>
           </a:p>
@@ -1217,7 +1216,7 @@
           <a:p>
             <a:fld id="{6A6E4237-9E27-40CF-A4D8-1330F92F21DA}" type="datetimeFigureOut">
               <a:rPr lang="en-US" smtClean="0"/>
-              <a:t>6/24/2022</a:t>
+              <a:t>7/13/2022</a:t>
             </a:fld>
             <a:endParaRPr lang="en-US"/>
           </a:p>
@@ -1415,7 +1414,7 @@
           <a:p>
             <a:fld id="{6A6E4237-9E27-40CF-A4D8-1330F92F21DA}" type="datetimeFigureOut">
               <a:rPr lang="en-US" smtClean="0"/>
-              <a:t>6/24/2022</a:t>
+              <a:t>7/13/2022</a:t>
             </a:fld>
             <a:endParaRPr lang="en-US"/>
           </a:p>
@@ -1623,7 +1622,7 @@
           <a:p>
             <a:fld id="{6A6E4237-9E27-40CF-A4D8-1330F92F21DA}" type="datetimeFigureOut">
               <a:rPr lang="en-US" smtClean="0"/>
-              <a:t>6/24/2022</a:t>
+              <a:t>7/13/2022</a:t>
             </a:fld>
             <a:endParaRPr lang="en-US"/>
           </a:p>
@@ -1821,7 +1820,7 @@
           <a:p>
             <a:fld id="{6A6E4237-9E27-40CF-A4D8-1330F92F21DA}" type="datetimeFigureOut">
               <a:rPr lang="en-US" smtClean="0"/>
-              <a:t>6/24/2022</a:t>
+              <a:t>7/13/2022</a:t>
             </a:fld>
             <a:endParaRPr lang="en-US"/>
           </a:p>
@@ -2096,7 +2095,7 @@
           <a:p>
             <a:fld id="{6A6E4237-9E27-40CF-A4D8-1330F92F21DA}" type="datetimeFigureOut">
               <a:rPr lang="en-US" smtClean="0"/>
-              <a:t>6/24/2022</a:t>
+              <a:t>7/13/2022</a:t>
             </a:fld>
             <a:endParaRPr lang="en-US"/>
           </a:p>
@@ -2361,7 +2360,7 @@
           <a:p>
             <a:fld id="{6A6E4237-9E27-40CF-A4D8-1330F92F21DA}" type="datetimeFigureOut">
               <a:rPr lang="en-US" smtClean="0"/>
-              <a:t>6/24/2022</a:t>
+              <a:t>7/13/2022</a:t>
             </a:fld>
             <a:endParaRPr lang="en-US"/>
           </a:p>
@@ -2773,7 +2772,7 @@
           <a:p>
             <a:fld id="{6A6E4237-9E27-40CF-A4D8-1330F92F21DA}" type="datetimeFigureOut">
               <a:rPr lang="en-US" smtClean="0"/>
-              <a:t>6/24/2022</a:t>
+              <a:t>7/13/2022</a:t>
             </a:fld>
             <a:endParaRPr lang="en-US"/>
           </a:p>
@@ -2914,7 +2913,7 @@
           <a:p>
             <a:fld id="{6A6E4237-9E27-40CF-A4D8-1330F92F21DA}" type="datetimeFigureOut">
               <a:rPr lang="en-US" smtClean="0"/>
-              <a:t>6/24/2022</a:t>
+              <a:t>7/13/2022</a:t>
             </a:fld>
             <a:endParaRPr lang="en-US"/>
           </a:p>
@@ -3027,7 +3026,7 @@
           <a:p>
             <a:fld id="{6A6E4237-9E27-40CF-A4D8-1330F92F21DA}" type="datetimeFigureOut">
               <a:rPr lang="en-US" smtClean="0"/>
-              <a:t>6/24/2022</a:t>
+              <a:t>7/13/2022</a:t>
             </a:fld>
             <a:endParaRPr lang="en-US"/>
           </a:p>
@@ -3338,7 +3337,7 @@
           <a:p>
             <a:fld id="{6A6E4237-9E27-40CF-A4D8-1330F92F21DA}" type="datetimeFigureOut">
               <a:rPr lang="en-US" smtClean="0"/>
-              <a:t>6/24/2022</a:t>
+              <a:t>7/13/2022</a:t>
             </a:fld>
             <a:endParaRPr lang="en-US"/>
           </a:p>
@@ -3626,7 +3625,7 @@
           <a:p>
             <a:fld id="{6A6E4237-9E27-40CF-A4D8-1330F92F21DA}" type="datetimeFigureOut">
               <a:rPr lang="en-US" smtClean="0"/>
-              <a:t>6/24/2022</a:t>
+              <a:t>7/13/2022</a:t>
             </a:fld>
             <a:endParaRPr lang="en-US"/>
           </a:p>
@@ -3867,7 +3866,7 @@
           <a:p>
             <a:fld id="{6A6E4237-9E27-40CF-A4D8-1330F92F21DA}" type="datetimeFigureOut">
               <a:rPr lang="en-US" smtClean="0"/>
-              <a:t>6/24/2022</a:t>
+              <a:t>7/13/2022</a:t>
             </a:fld>
             <a:endParaRPr lang="en-US"/>
           </a:p>
@@ -4362,12 +4361,22 @@
                 <a:latin typeface="Yu Gothic" panose="020B0400000000000000" pitchFamily="34" charset="-128"/>
                 <a:ea typeface="Yu Gothic" panose="020B0400000000000000" pitchFamily="34" charset="-128"/>
               </a:rPr>
-              <a:t>20220624</a:t>
-            </a:r>
-          </a:p>
-          <a:p>
-            <a:r>
-              <a:rPr lang="en-US">
+              <a:t>20220713</a:t>
+            </a:r>
+            <a:endParaRPr lang="en-US" dirty="0">
+              <a:solidFill>
+                <a:schemeClr val="tx1">
+                  <a:lumMod val="50000"/>
+                  <a:lumOff val="50000"/>
+                </a:schemeClr>
+              </a:solidFill>
+              <a:latin typeface="Yu Gothic" panose="020B0400000000000000" pitchFamily="34" charset="-128"/>
+              <a:ea typeface="Yu Gothic" panose="020B0400000000000000" pitchFamily="34" charset="-128"/>
+            </a:endParaRPr>
+          </a:p>
+          <a:p>
+            <a:r>
+              <a:rPr lang="en-US" dirty="0">
                 <a:solidFill>
                   <a:schemeClr val="tx1">
                     <a:lumMod val="50000"/>
@@ -4382,7 +4391,7 @@
           </a:p>
           <a:p>
             <a:r>
-              <a:rPr lang="en-US">
+              <a:rPr lang="en-US" dirty="0">
                 <a:solidFill>
                   <a:schemeClr val="tx1">
                     <a:lumMod val="50000"/>
@@ -5590,8 +5599,8 @@
           </a:p>
         </p:txBody>
       </p:sp>
-      <mc:AlternateContent xmlns:mc="http://schemas.openxmlformats.org/markup-compatibility/2006">
-        <mc:Choice xmlns:p14="http://schemas.microsoft.com/office/powerpoint/2010/main" Requires="p14">
+      <mc:AlternateContent xmlns:mc="http://schemas.openxmlformats.org/markup-compatibility/2006" xmlns:p14="http://schemas.microsoft.com/office/powerpoint/2010/main">
+        <mc:Choice Requires="p14">
           <p:contentPart p14:bwMode="auto" r:id="rId2">
             <p14:nvContentPartPr>
               <p14:cNvPr id="4" name="Ink 3">
@@ -5610,7 +5619,7 @@
             </p14:xfrm>
           </p:contentPart>
         </mc:Choice>
-        <mc:Fallback>
+        <mc:Fallback xmlns="">
           <p:pic>
             <p:nvPicPr>
               <p:cNvPr id="4" name="Ink 3">
@@ -5641,8 +5650,8 @@
           </p:pic>
         </mc:Fallback>
       </mc:AlternateContent>
-      <mc:AlternateContent xmlns:mc="http://schemas.openxmlformats.org/markup-compatibility/2006">
-        <mc:Choice xmlns:p14="http://schemas.microsoft.com/office/powerpoint/2010/main" Requires="p14">
+      <mc:AlternateContent xmlns:mc="http://schemas.openxmlformats.org/markup-compatibility/2006" xmlns:p14="http://schemas.microsoft.com/office/powerpoint/2010/main">
+        <mc:Choice Requires="p14">
           <p:contentPart p14:bwMode="auto" r:id="rId4">
             <p14:nvContentPartPr>
               <p14:cNvPr id="5" name="Ink 4">
@@ -5661,7 +5670,7 @@
             </p14:xfrm>
           </p:contentPart>
         </mc:Choice>
-        <mc:Fallback>
+        <mc:Fallback xmlns="">
           <p:pic>
             <p:nvPicPr>
               <p:cNvPr id="5" name="Ink 4">
@@ -5692,8 +5701,8 @@
           </p:pic>
         </mc:Fallback>
       </mc:AlternateContent>
-      <mc:AlternateContent xmlns:mc="http://schemas.openxmlformats.org/markup-compatibility/2006">
-        <mc:Choice xmlns:p14="http://schemas.microsoft.com/office/powerpoint/2010/main" Requires="p14">
+      <mc:AlternateContent xmlns:mc="http://schemas.openxmlformats.org/markup-compatibility/2006" xmlns:p14="http://schemas.microsoft.com/office/powerpoint/2010/main">
+        <mc:Choice Requires="p14">
           <p:contentPart p14:bwMode="auto" r:id="rId5">
             <p14:nvContentPartPr>
               <p14:cNvPr id="6" name="Ink 5">
@@ -5712,7 +5721,7 @@
             </p14:xfrm>
           </p:contentPart>
         </mc:Choice>
-        <mc:Fallback>
+        <mc:Fallback xmlns="">
           <p:pic>
             <p:nvPicPr>
               <p:cNvPr id="6" name="Ink 5">
@@ -5743,8 +5752,8 @@
           </p:pic>
         </mc:Fallback>
       </mc:AlternateContent>
-      <mc:AlternateContent xmlns:mc="http://schemas.openxmlformats.org/markup-compatibility/2006">
-        <mc:Choice xmlns:p14="http://schemas.microsoft.com/office/powerpoint/2010/main" Requires="p14">
+      <mc:AlternateContent xmlns:mc="http://schemas.openxmlformats.org/markup-compatibility/2006" xmlns:p14="http://schemas.microsoft.com/office/powerpoint/2010/main">
+        <mc:Choice Requires="p14">
           <p:contentPart p14:bwMode="auto" r:id="rId7">
             <p14:nvContentPartPr>
               <p14:cNvPr id="7" name="Ink 6">
@@ -5763,7 +5772,7 @@
             </p14:xfrm>
           </p:contentPart>
         </mc:Choice>
-        <mc:Fallback>
+        <mc:Fallback xmlns="">
           <p:pic>
             <p:nvPicPr>
               <p:cNvPr id="7" name="Ink 6">
@@ -5814,8 +5823,8 @@
             <a:chExt cx="360" cy="360"/>
           </a:xfrm>
         </p:grpSpPr>
-        <mc:AlternateContent xmlns:mc="http://schemas.openxmlformats.org/markup-compatibility/2006">
-          <mc:Choice xmlns:p14="http://schemas.microsoft.com/office/powerpoint/2010/main" Requires="p14">
+        <mc:AlternateContent xmlns:mc="http://schemas.openxmlformats.org/markup-compatibility/2006" xmlns:p14="http://schemas.microsoft.com/office/powerpoint/2010/main">
+          <mc:Choice Requires="p14">
             <p:contentPart p14:bwMode="auto" r:id="rId8">
               <p14:nvContentPartPr>
                 <p14:cNvPr id="8" name="Ink 7">
@@ -5834,7 +5843,7 @@
               </p14:xfrm>
             </p:contentPart>
           </mc:Choice>
-          <mc:Fallback>
+          <mc:Fallback xmlns="">
             <p:pic>
               <p:nvPicPr>
                 <p:cNvPr id="8" name="Ink 7">
@@ -5865,8 +5874,8 @@
             </p:pic>
           </mc:Fallback>
         </mc:AlternateContent>
-        <mc:AlternateContent xmlns:mc="http://schemas.openxmlformats.org/markup-compatibility/2006">
-          <mc:Choice xmlns:p14="http://schemas.microsoft.com/office/powerpoint/2010/main" Requires="p14">
+        <mc:AlternateContent xmlns:mc="http://schemas.openxmlformats.org/markup-compatibility/2006" xmlns:p14="http://schemas.microsoft.com/office/powerpoint/2010/main">
+          <mc:Choice Requires="p14">
             <p:contentPart p14:bwMode="auto" r:id="rId9">
               <p14:nvContentPartPr>
                 <p14:cNvPr id="9" name="Ink 8">
@@ -5885,7 +5894,7 @@
               </p14:xfrm>
             </p:contentPart>
           </mc:Choice>
-          <mc:Fallback>
+          <mc:Fallback xmlns="">
             <p:pic>
               <p:nvPicPr>
                 <p:cNvPr id="9" name="Ink 8">
@@ -5916,8 +5925,8 @@
             </p:pic>
           </mc:Fallback>
         </mc:AlternateContent>
-        <mc:AlternateContent xmlns:mc="http://schemas.openxmlformats.org/markup-compatibility/2006">
-          <mc:Choice xmlns:p14="http://schemas.microsoft.com/office/powerpoint/2010/main" Requires="p14">
+        <mc:AlternateContent xmlns:mc="http://schemas.openxmlformats.org/markup-compatibility/2006" xmlns:p14="http://schemas.microsoft.com/office/powerpoint/2010/main">
+          <mc:Choice Requires="p14">
             <p:contentPart p14:bwMode="auto" r:id="rId10">
               <p14:nvContentPartPr>
                 <p14:cNvPr id="10" name="Ink 9">
@@ -5936,7 +5945,7 @@
               </p14:xfrm>
             </p:contentPart>
           </mc:Choice>
-          <mc:Fallback>
+          <mc:Fallback xmlns="">
             <p:pic>
               <p:nvPicPr>
                 <p:cNvPr id="10" name="Ink 9">
@@ -5968,8 +5977,8 @@
           </mc:Fallback>
         </mc:AlternateContent>
       </p:grpSp>
-      <mc:AlternateContent xmlns:mc="http://schemas.openxmlformats.org/markup-compatibility/2006">
-        <mc:Choice xmlns:p14="http://schemas.microsoft.com/office/powerpoint/2010/main" Requires="p14">
+      <mc:AlternateContent xmlns:mc="http://schemas.openxmlformats.org/markup-compatibility/2006" xmlns:p14="http://schemas.microsoft.com/office/powerpoint/2010/main">
+        <mc:Choice Requires="p14">
           <p:contentPart p14:bwMode="auto" r:id="rId11">
             <p14:nvContentPartPr>
               <p14:cNvPr id="11" name="Ink 10">
@@ -5988,7 +5997,7 @@
             </p14:xfrm>
           </p:contentPart>
         </mc:Choice>
-        <mc:Fallback>
+        <mc:Fallback xmlns="">
           <p:pic>
             <p:nvPicPr>
               <p:cNvPr id="11" name="Ink 10">
@@ -6039,8 +6048,8 @@
             <a:chExt cx="360" cy="360"/>
           </a:xfrm>
         </p:grpSpPr>
-        <mc:AlternateContent xmlns:mc="http://schemas.openxmlformats.org/markup-compatibility/2006">
-          <mc:Choice xmlns:p14="http://schemas.microsoft.com/office/powerpoint/2010/main" Requires="p14">
+        <mc:AlternateContent xmlns:mc="http://schemas.openxmlformats.org/markup-compatibility/2006" xmlns:p14="http://schemas.microsoft.com/office/powerpoint/2010/main">
+          <mc:Choice Requires="p14">
             <p:contentPart p14:bwMode="auto" r:id="rId12">
               <p14:nvContentPartPr>
                 <p14:cNvPr id="12" name="Ink 11">
@@ -6059,7 +6068,7 @@
               </p14:xfrm>
             </p:contentPart>
           </mc:Choice>
-          <mc:Fallback>
+          <mc:Fallback xmlns="">
             <p:pic>
               <p:nvPicPr>
                 <p:cNvPr id="12" name="Ink 11">
@@ -6090,8 +6099,8 @@
             </p:pic>
           </mc:Fallback>
         </mc:AlternateContent>
-        <mc:AlternateContent xmlns:mc="http://schemas.openxmlformats.org/markup-compatibility/2006">
-          <mc:Choice xmlns:p14="http://schemas.microsoft.com/office/powerpoint/2010/main" Requires="p14">
+        <mc:AlternateContent xmlns:mc="http://schemas.openxmlformats.org/markup-compatibility/2006" xmlns:p14="http://schemas.microsoft.com/office/powerpoint/2010/main">
+          <mc:Choice Requires="p14">
             <p:contentPart p14:bwMode="auto" r:id="rId13">
               <p14:nvContentPartPr>
                 <p14:cNvPr id="13" name="Ink 12">
@@ -6110,7 +6119,7 @@
               </p14:xfrm>
             </p:contentPart>
           </mc:Choice>
-          <mc:Fallback>
+          <mc:Fallback xmlns="">
             <p:pic>
               <p:nvPicPr>
                 <p:cNvPr id="13" name="Ink 12">

</xml_diff>